<commit_message>
More work on test cases.
</commit_message>
<xml_diff>
--- a/data/tests/win32/Math_003_control_loop/description/Math_003.pptx
+++ b/data/tests/win32/Math_003_control_loop/description/Math_003.pptx
@@ -140,6 +140,41 @@
       </a:defRPr>
     </a:lvl9pPr>
   </p:defaultTextStyle>
+  <p:extLst>
+    <p:ext uri="{EFAFB233-063F-42B5-8137-9DF3F51BA10A}">
+      <p15:sldGuideLst xmlns:p15="http://schemas.microsoft.com/office/powerpoint/2012/main">
+        <p15:guide id="1" orient="horz" pos="4992">
+          <p15:clr>
+            <a:srgbClr val="A4A3A4"/>
+          </p15:clr>
+        </p15:guide>
+        <p15:guide id="2" pos="7079">
+          <p15:clr>
+            <a:srgbClr val="A4A3A4"/>
+          </p15:clr>
+        </p15:guide>
+        <p15:guide id="3" pos="7125">
+          <p15:clr>
+            <a:srgbClr val="A4A3A4"/>
+          </p15:clr>
+        </p15:guide>
+      </p15:sldGuideLst>
+    </p:ext>
+    <p:ext uri="{2D200454-40CA-4A62-9FC3-DE9A4176ACB9}">
+      <p15:notesGuideLst xmlns:p15="http://schemas.microsoft.com/office/powerpoint/2012/main">
+        <p15:guide id="1" orient="horz" pos="3164">
+          <p15:clr>
+            <a:srgbClr val="A4A3A4"/>
+          </p15:clr>
+        </p15:guide>
+        <p15:guide id="2" pos="2179">
+          <p15:clr>
+            <a:srgbClr val="A4A3A4"/>
+          </p15:clr>
+        </p15:guide>
+      </p15:notesGuideLst>
+    </p:ext>
+  </p:extLst>
 </p:presentation>
 </file>
 

</xml_diff>